<commit_message>
Added last task to powerpoint
</commit_message>
<xml_diff>
--- a/WAD2Project.pptx
+++ b/WAD2Project.pptx
@@ -8,6 +8,8 @@
     <p:sldId id="257" r:id="rId2"/>
     <p:sldId id="258" r:id="rId3"/>
     <p:sldId id="259" r:id="rId4"/>
+    <p:sldId id="261" r:id="rId5"/>
+    <p:sldId id="260" r:id="rId6"/>
   </p:sldIdLst>
   <p:sldSz cx="12192000" cy="6858000"/>
   <p:notesSz cx="6858000" cy="9144000"/>
@@ -245,7 +247,7 @@
           <a:p>
             <a:fld id="{480300DF-435D-42C3-B2E0-8DEDDCD98509}" type="datetimeFigureOut">
               <a:rPr lang="en-GB" smtClean="0"/>
-              <a:t>19/02/2017</a:t>
+              <a:t>21/02/2017</a:t>
             </a:fld>
             <a:endParaRPr lang="en-GB"/>
           </a:p>
@@ -415,7 +417,7 @@
           <a:p>
             <a:fld id="{480300DF-435D-42C3-B2E0-8DEDDCD98509}" type="datetimeFigureOut">
               <a:rPr lang="en-GB" smtClean="0"/>
-              <a:t>19/02/2017</a:t>
+              <a:t>21/02/2017</a:t>
             </a:fld>
             <a:endParaRPr lang="en-GB"/>
           </a:p>
@@ -595,7 +597,7 @@
           <a:p>
             <a:fld id="{480300DF-435D-42C3-B2E0-8DEDDCD98509}" type="datetimeFigureOut">
               <a:rPr lang="en-GB" smtClean="0"/>
-              <a:t>19/02/2017</a:t>
+              <a:t>21/02/2017</a:t>
             </a:fld>
             <a:endParaRPr lang="en-GB"/>
           </a:p>
@@ -765,7 +767,7 @@
           <a:p>
             <a:fld id="{480300DF-435D-42C3-B2E0-8DEDDCD98509}" type="datetimeFigureOut">
               <a:rPr lang="en-GB" smtClean="0"/>
-              <a:t>19/02/2017</a:t>
+              <a:t>21/02/2017</a:t>
             </a:fld>
             <a:endParaRPr lang="en-GB"/>
           </a:p>
@@ -1011,7 +1013,7 @@
           <a:p>
             <a:fld id="{480300DF-435D-42C3-B2E0-8DEDDCD98509}" type="datetimeFigureOut">
               <a:rPr lang="en-GB" smtClean="0"/>
-              <a:t>19/02/2017</a:t>
+              <a:t>21/02/2017</a:t>
             </a:fld>
             <a:endParaRPr lang="en-GB"/>
           </a:p>
@@ -1243,7 +1245,7 @@
           <a:p>
             <a:fld id="{480300DF-435D-42C3-B2E0-8DEDDCD98509}" type="datetimeFigureOut">
               <a:rPr lang="en-GB" smtClean="0"/>
-              <a:t>19/02/2017</a:t>
+              <a:t>21/02/2017</a:t>
             </a:fld>
             <a:endParaRPr lang="en-GB"/>
           </a:p>
@@ -1610,7 +1612,7 @@
           <a:p>
             <a:fld id="{480300DF-435D-42C3-B2E0-8DEDDCD98509}" type="datetimeFigureOut">
               <a:rPr lang="en-GB" smtClean="0"/>
-              <a:t>19/02/2017</a:t>
+              <a:t>21/02/2017</a:t>
             </a:fld>
             <a:endParaRPr lang="en-GB"/>
           </a:p>
@@ -1728,7 +1730,7 @@
           <a:p>
             <a:fld id="{480300DF-435D-42C3-B2E0-8DEDDCD98509}" type="datetimeFigureOut">
               <a:rPr lang="en-GB" smtClean="0"/>
-              <a:t>19/02/2017</a:t>
+              <a:t>21/02/2017</a:t>
             </a:fld>
             <a:endParaRPr lang="en-GB"/>
           </a:p>
@@ -1823,7 +1825,7 @@
           <a:p>
             <a:fld id="{480300DF-435D-42C3-B2E0-8DEDDCD98509}" type="datetimeFigureOut">
               <a:rPr lang="en-GB" smtClean="0"/>
-              <a:t>19/02/2017</a:t>
+              <a:t>21/02/2017</a:t>
             </a:fld>
             <a:endParaRPr lang="en-GB"/>
           </a:p>
@@ -2100,7 +2102,7 @@
           <a:p>
             <a:fld id="{480300DF-435D-42C3-B2E0-8DEDDCD98509}" type="datetimeFigureOut">
               <a:rPr lang="en-GB" smtClean="0"/>
-              <a:t>19/02/2017</a:t>
+              <a:t>21/02/2017</a:t>
             </a:fld>
             <a:endParaRPr lang="en-GB"/>
           </a:p>
@@ -2353,7 +2355,7 @@
           <a:p>
             <a:fld id="{480300DF-435D-42C3-B2E0-8DEDDCD98509}" type="datetimeFigureOut">
               <a:rPr lang="en-GB" smtClean="0"/>
-              <a:t>19/02/2017</a:t>
+              <a:t>21/02/2017</a:t>
             </a:fld>
             <a:endParaRPr lang="en-GB"/>
           </a:p>
@@ -2566,7 +2568,7 @@
           <a:p>
             <a:fld id="{480300DF-435D-42C3-B2E0-8DEDDCD98509}" type="datetimeFigureOut">
               <a:rPr lang="en-GB" smtClean="0"/>
-              <a:t>19/02/2017</a:t>
+              <a:t>21/02/2017</a:t>
             </a:fld>
             <a:endParaRPr lang="en-GB"/>
           </a:p>
@@ -3932,6 +3934,816 @@
 </p:sld>
 </file>
 
+<file path=ppt/slides/slide4.xml><?xml version="1.0" encoding="utf-8"?>
+<p:sld xmlns:a="http://schemas.openxmlformats.org/drawingml/2006/main" xmlns:r="http://schemas.openxmlformats.org/officeDocument/2006/relationships" xmlns:p="http://schemas.openxmlformats.org/presentationml/2006/main">
+  <p:cSld>
+    <p:spTree>
+      <p:nvGrpSpPr>
+        <p:cNvPr id="1" name=""/>
+        <p:cNvGrpSpPr/>
+        <p:nvPr/>
+      </p:nvGrpSpPr>
+      <p:grpSpPr>
+        <a:xfrm>
+          <a:off x="0" y="0"/>
+          <a:ext cx="0" cy="0"/>
+          <a:chOff x="0" y="0"/>
+          <a:chExt cx="0" cy="0"/>
+        </a:xfrm>
+      </p:grpSpPr>
+      <p:sp>
+        <p:nvSpPr>
+          <p:cNvPr id="2" name="Title 1"/>
+          <p:cNvSpPr>
+            <a:spLocks noGrp="1"/>
+          </p:cNvSpPr>
+          <p:nvPr>
+            <p:ph type="title"/>
+          </p:nvPr>
+        </p:nvSpPr>
+        <p:spPr/>
+        <p:txBody>
+          <a:bodyPr>
+            <a:normAutofit/>
+          </a:bodyPr>
+          <a:lstStyle/>
+          <a:p>
+            <a:pPr algn="ctr"/>
+            <a:r>
+              <a:rPr lang="en-GB" sz="5400" b="1" dirty="0"/>
+              <a:t>Site Map</a:t>
+            </a:r>
+          </a:p>
+        </p:txBody>
+      </p:sp>
+      <p:sp>
+        <p:nvSpPr>
+          <p:cNvPr id="4" name="TextBox 3"/>
+          <p:cNvSpPr txBox="1"/>
+          <p:nvPr/>
+        </p:nvSpPr>
+        <p:spPr>
+          <a:xfrm>
+            <a:off x="5460889" y="1598355"/>
+            <a:ext cx="1875847" cy="523220"/>
+          </a:xfrm>
+          <a:prstGeom prst="rect">
+            <a:avLst/>
+          </a:prstGeom>
+          <a:noFill/>
+          <a:ln w="28575">
+            <a:solidFill>
+              <a:schemeClr val="tx1"/>
+            </a:solidFill>
+          </a:ln>
+        </p:spPr>
+        <p:txBody>
+          <a:bodyPr wrap="square" rtlCol="0">
+            <a:spAutoFit/>
+          </a:bodyPr>
+          <a:lstStyle/>
+          <a:p>
+            <a:pPr algn="ctr"/>
+            <a:r>
+              <a:rPr lang="en-GB" sz="2800" b="1" dirty="0"/>
+              <a:t>Home Page</a:t>
+            </a:r>
+          </a:p>
+        </p:txBody>
+      </p:sp>
+      <p:sp>
+        <p:nvSpPr>
+          <p:cNvPr id="5" name="TextBox 4"/>
+          <p:cNvSpPr txBox="1"/>
+          <p:nvPr/>
+        </p:nvSpPr>
+        <p:spPr>
+          <a:xfrm>
+            <a:off x="4616745" y="2841293"/>
+            <a:ext cx="2208145" cy="523220"/>
+          </a:xfrm>
+          <a:prstGeom prst="rect">
+            <a:avLst/>
+          </a:prstGeom>
+          <a:noFill/>
+          <a:ln w="28575">
+            <a:solidFill>
+              <a:schemeClr val="tx1"/>
+            </a:solidFill>
+          </a:ln>
+        </p:spPr>
+        <p:txBody>
+          <a:bodyPr wrap="square" rtlCol="0">
+            <a:spAutoFit/>
+          </a:bodyPr>
+          <a:lstStyle/>
+          <a:p>
+            <a:pPr algn="ctr"/>
+            <a:r>
+              <a:rPr lang="en-GB" sz="2800" b="1" dirty="0"/>
+              <a:t>News Stories</a:t>
+            </a:r>
+          </a:p>
+        </p:txBody>
+      </p:sp>
+      <p:sp>
+        <p:nvSpPr>
+          <p:cNvPr id="10" name="TextBox 9"/>
+          <p:cNvSpPr txBox="1"/>
+          <p:nvPr/>
+        </p:nvSpPr>
+        <p:spPr>
+          <a:xfrm>
+            <a:off x="274813" y="4253508"/>
+            <a:ext cx="2005884" cy="523220"/>
+          </a:xfrm>
+          <a:prstGeom prst="rect">
+            <a:avLst/>
+          </a:prstGeom>
+          <a:noFill/>
+          <a:ln w="28575">
+            <a:solidFill>
+              <a:schemeClr val="tx1"/>
+            </a:solidFill>
+          </a:ln>
+        </p:spPr>
+        <p:txBody>
+          <a:bodyPr wrap="square" rtlCol="0">
+            <a:spAutoFit/>
+          </a:bodyPr>
+          <a:lstStyle/>
+          <a:p>
+            <a:pPr algn="ctr"/>
+            <a:r>
+              <a:rPr lang="en-GB" sz="2800" b="1" dirty="0"/>
+              <a:t>My Account</a:t>
+            </a:r>
+          </a:p>
+        </p:txBody>
+      </p:sp>
+      <p:sp>
+        <p:nvSpPr>
+          <p:cNvPr id="11" name="TextBox 10"/>
+          <p:cNvSpPr txBox="1"/>
+          <p:nvPr/>
+        </p:nvSpPr>
+        <p:spPr>
+          <a:xfrm>
+            <a:off x="4862057" y="4253508"/>
+            <a:ext cx="1725763" cy="523220"/>
+          </a:xfrm>
+          <a:prstGeom prst="rect">
+            <a:avLst/>
+          </a:prstGeom>
+          <a:noFill/>
+          <a:ln w="28575">
+            <a:solidFill>
+              <a:schemeClr val="tx1"/>
+            </a:solidFill>
+          </a:ln>
+        </p:spPr>
+        <p:txBody>
+          <a:bodyPr wrap="square" rtlCol="0">
+            <a:spAutoFit/>
+          </a:bodyPr>
+          <a:lstStyle/>
+          <a:p>
+            <a:pPr algn="ctr"/>
+            <a:r>
+              <a:rPr lang="en-GB" sz="2800" b="1" dirty="0"/>
+              <a:t>New Post</a:t>
+            </a:r>
+          </a:p>
+        </p:txBody>
+      </p:sp>
+      <p:sp>
+        <p:nvSpPr>
+          <p:cNvPr id="12" name="TextBox 11"/>
+          <p:cNvSpPr txBox="1"/>
+          <p:nvPr/>
+        </p:nvSpPr>
+        <p:spPr>
+          <a:xfrm>
+            <a:off x="9517548" y="2831585"/>
+            <a:ext cx="2461093" cy="523220"/>
+          </a:xfrm>
+          <a:prstGeom prst="rect">
+            <a:avLst/>
+          </a:prstGeom>
+          <a:noFill/>
+          <a:ln w="28575">
+            <a:solidFill>
+              <a:schemeClr val="tx1"/>
+            </a:solidFill>
+          </a:ln>
+        </p:spPr>
+        <p:txBody>
+          <a:bodyPr wrap="square" rtlCol="0">
+            <a:spAutoFit/>
+          </a:bodyPr>
+          <a:lstStyle/>
+          <a:p>
+            <a:pPr algn="ctr"/>
+            <a:r>
+              <a:rPr lang="en-GB" sz="2800" b="1" dirty="0"/>
+              <a:t>Fact or Fiction</a:t>
+            </a:r>
+          </a:p>
+        </p:txBody>
+      </p:sp>
+      <p:sp>
+        <p:nvSpPr>
+          <p:cNvPr id="13" name="TextBox 12"/>
+          <p:cNvSpPr txBox="1"/>
+          <p:nvPr/>
+        </p:nvSpPr>
+        <p:spPr>
+          <a:xfrm>
+            <a:off x="536627" y="2833357"/>
+            <a:ext cx="1270221" cy="523220"/>
+          </a:xfrm>
+          <a:prstGeom prst="rect">
+            <a:avLst/>
+          </a:prstGeom>
+          <a:noFill/>
+          <a:ln w="28575">
+            <a:solidFill>
+              <a:schemeClr val="tx1"/>
+            </a:solidFill>
+          </a:ln>
+        </p:spPr>
+        <p:txBody>
+          <a:bodyPr wrap="square" rtlCol="0">
+            <a:spAutoFit/>
+          </a:bodyPr>
+          <a:lstStyle/>
+          <a:p>
+            <a:pPr algn="ctr"/>
+            <a:r>
+              <a:rPr lang="en-GB" sz="2800" b="1" dirty="0"/>
+              <a:t>Login</a:t>
+            </a:r>
+          </a:p>
+        </p:txBody>
+      </p:sp>
+      <p:sp>
+        <p:nvSpPr>
+          <p:cNvPr id="15" name="TextBox 14"/>
+          <p:cNvSpPr txBox="1"/>
+          <p:nvPr/>
+        </p:nvSpPr>
+        <p:spPr>
+          <a:xfrm>
+            <a:off x="7241859" y="2841293"/>
+            <a:ext cx="1986169" cy="523220"/>
+          </a:xfrm>
+          <a:prstGeom prst="rect">
+            <a:avLst/>
+          </a:prstGeom>
+          <a:noFill/>
+          <a:ln w="28575">
+            <a:solidFill>
+              <a:schemeClr val="tx1"/>
+            </a:solidFill>
+          </a:ln>
+        </p:spPr>
+        <p:txBody>
+          <a:bodyPr wrap="square" rtlCol="0">
+            <a:spAutoFit/>
+          </a:bodyPr>
+          <a:lstStyle/>
+          <a:p>
+            <a:pPr algn="ctr"/>
+            <a:r>
+              <a:rPr lang="en-GB" sz="2800" b="1" dirty="0"/>
+              <a:t>Top Posts</a:t>
+            </a:r>
+          </a:p>
+        </p:txBody>
+      </p:sp>
+      <p:sp>
+        <p:nvSpPr>
+          <p:cNvPr id="16" name="TextBox 15"/>
+          <p:cNvSpPr txBox="1"/>
+          <p:nvPr/>
+        </p:nvSpPr>
+        <p:spPr>
+          <a:xfrm>
+            <a:off x="2596968" y="2831585"/>
+            <a:ext cx="1512073" cy="523220"/>
+          </a:xfrm>
+          <a:prstGeom prst="rect">
+            <a:avLst/>
+          </a:prstGeom>
+          <a:noFill/>
+          <a:ln w="28575">
+            <a:solidFill>
+              <a:schemeClr val="tx1"/>
+            </a:solidFill>
+          </a:ln>
+        </p:spPr>
+        <p:txBody>
+          <a:bodyPr wrap="square" rtlCol="0">
+            <a:spAutoFit/>
+          </a:bodyPr>
+          <a:lstStyle/>
+          <a:p>
+            <a:pPr algn="ctr"/>
+            <a:r>
+              <a:rPr lang="en-GB" sz="2800" b="1" dirty="0"/>
+              <a:t>About</a:t>
+            </a:r>
+          </a:p>
+        </p:txBody>
+      </p:sp>
+      <p:cxnSp>
+        <p:nvCxnSpPr>
+          <p:cNvPr id="18" name="Straight Connector 17"/>
+          <p:cNvCxnSpPr>
+            <a:stCxn id="4" idx="2"/>
+          </p:cNvCxnSpPr>
+          <p:nvPr/>
+        </p:nvCxnSpPr>
+        <p:spPr>
+          <a:xfrm flipH="1">
+            <a:off x="6398812" y="2121575"/>
+            <a:ext cx="1" cy="250564"/>
+          </a:xfrm>
+          <a:prstGeom prst="line">
+            <a:avLst/>
+          </a:prstGeom>
+          <a:ln w="57150">
+            <a:solidFill>
+              <a:schemeClr val="tx1"/>
+            </a:solidFill>
+          </a:ln>
+        </p:spPr>
+        <p:style>
+          <a:lnRef idx="1">
+            <a:schemeClr val="accent1"/>
+          </a:lnRef>
+          <a:fillRef idx="0">
+            <a:schemeClr val="accent1"/>
+          </a:fillRef>
+          <a:effectRef idx="0">
+            <a:schemeClr val="accent1"/>
+          </a:effectRef>
+          <a:fontRef idx="minor">
+            <a:schemeClr val="tx1"/>
+          </a:fontRef>
+        </p:style>
+      </p:cxnSp>
+      <p:cxnSp>
+        <p:nvCxnSpPr>
+          <p:cNvPr id="20" name="Straight Connector 19"/>
+          <p:cNvCxnSpPr/>
+          <p:nvPr/>
+        </p:nvCxnSpPr>
+        <p:spPr>
+          <a:xfrm>
+            <a:off x="1171737" y="2372139"/>
+            <a:ext cx="9681793" cy="0"/>
+          </a:xfrm>
+          <a:prstGeom prst="line">
+            <a:avLst/>
+          </a:prstGeom>
+          <a:ln w="57150">
+            <a:solidFill>
+              <a:schemeClr val="tx1"/>
+            </a:solidFill>
+          </a:ln>
+        </p:spPr>
+        <p:style>
+          <a:lnRef idx="1">
+            <a:schemeClr val="accent1"/>
+          </a:lnRef>
+          <a:fillRef idx="0">
+            <a:schemeClr val="accent1"/>
+          </a:fillRef>
+          <a:effectRef idx="0">
+            <a:schemeClr val="accent1"/>
+          </a:effectRef>
+          <a:fontRef idx="minor">
+            <a:schemeClr val="tx1"/>
+          </a:fontRef>
+        </p:style>
+      </p:cxnSp>
+      <p:cxnSp>
+        <p:nvCxnSpPr>
+          <p:cNvPr id="22" name="Straight Connector 21"/>
+          <p:cNvCxnSpPr>
+            <a:cxnSpLocks/>
+          </p:cNvCxnSpPr>
+          <p:nvPr/>
+        </p:nvCxnSpPr>
+        <p:spPr>
+          <a:xfrm>
+            <a:off x="1177282" y="2371562"/>
+            <a:ext cx="1" cy="461218"/>
+          </a:xfrm>
+          <a:prstGeom prst="line">
+            <a:avLst/>
+          </a:prstGeom>
+          <a:ln w="57150">
+            <a:solidFill>
+              <a:schemeClr val="tx1"/>
+            </a:solidFill>
+          </a:ln>
+        </p:spPr>
+        <p:style>
+          <a:lnRef idx="1">
+            <a:schemeClr val="accent1"/>
+          </a:lnRef>
+          <a:fillRef idx="0">
+            <a:schemeClr val="accent1"/>
+          </a:fillRef>
+          <a:effectRef idx="0">
+            <a:schemeClr val="accent1"/>
+          </a:effectRef>
+          <a:fontRef idx="minor">
+            <a:schemeClr val="tx1"/>
+          </a:fontRef>
+        </p:style>
+      </p:cxnSp>
+      <p:cxnSp>
+        <p:nvCxnSpPr>
+          <p:cNvPr id="24" name="Straight Connector 23"/>
+          <p:cNvCxnSpPr>
+            <a:cxnSpLocks/>
+          </p:cNvCxnSpPr>
+          <p:nvPr/>
+        </p:nvCxnSpPr>
+        <p:spPr>
+          <a:xfrm flipH="1">
+            <a:off x="3399097" y="2344408"/>
+            <a:ext cx="2" cy="496302"/>
+          </a:xfrm>
+          <a:prstGeom prst="line">
+            <a:avLst/>
+          </a:prstGeom>
+          <a:ln w="57150">
+            <a:solidFill>
+              <a:schemeClr val="tx1"/>
+            </a:solidFill>
+          </a:ln>
+        </p:spPr>
+        <p:style>
+          <a:lnRef idx="1">
+            <a:schemeClr val="accent1"/>
+          </a:lnRef>
+          <a:fillRef idx="0">
+            <a:schemeClr val="accent1"/>
+          </a:fillRef>
+          <a:effectRef idx="0">
+            <a:schemeClr val="accent1"/>
+          </a:effectRef>
+          <a:fontRef idx="minor">
+            <a:schemeClr val="tx1"/>
+          </a:fontRef>
+        </p:style>
+      </p:cxnSp>
+      <p:cxnSp>
+        <p:nvCxnSpPr>
+          <p:cNvPr id="26" name="Straight Connector 25"/>
+          <p:cNvCxnSpPr>
+            <a:cxnSpLocks/>
+          </p:cNvCxnSpPr>
+          <p:nvPr/>
+        </p:nvCxnSpPr>
+        <p:spPr>
+          <a:xfrm>
+            <a:off x="5720817" y="2392095"/>
+            <a:ext cx="1" cy="461218"/>
+          </a:xfrm>
+          <a:prstGeom prst="line">
+            <a:avLst/>
+          </a:prstGeom>
+          <a:ln w="57150">
+            <a:solidFill>
+              <a:schemeClr val="tx1"/>
+            </a:solidFill>
+          </a:ln>
+        </p:spPr>
+        <p:style>
+          <a:lnRef idx="1">
+            <a:schemeClr val="accent1"/>
+          </a:lnRef>
+          <a:fillRef idx="0">
+            <a:schemeClr val="accent1"/>
+          </a:fillRef>
+          <a:effectRef idx="0">
+            <a:schemeClr val="accent1"/>
+          </a:effectRef>
+          <a:fontRef idx="minor">
+            <a:schemeClr val="tx1"/>
+          </a:fontRef>
+        </p:style>
+      </p:cxnSp>
+      <p:cxnSp>
+        <p:nvCxnSpPr>
+          <p:cNvPr id="27" name="Straight Connector 26"/>
+          <p:cNvCxnSpPr>
+            <a:cxnSpLocks/>
+          </p:cNvCxnSpPr>
+          <p:nvPr/>
+        </p:nvCxnSpPr>
+        <p:spPr>
+          <a:xfrm>
+            <a:off x="8242484" y="2379492"/>
+            <a:ext cx="1" cy="461218"/>
+          </a:xfrm>
+          <a:prstGeom prst="line">
+            <a:avLst/>
+          </a:prstGeom>
+          <a:ln w="57150">
+            <a:solidFill>
+              <a:schemeClr val="tx1"/>
+            </a:solidFill>
+          </a:ln>
+        </p:spPr>
+        <p:style>
+          <a:lnRef idx="1">
+            <a:schemeClr val="accent1"/>
+          </a:lnRef>
+          <a:fillRef idx="0">
+            <a:schemeClr val="accent1"/>
+          </a:fillRef>
+          <a:effectRef idx="0">
+            <a:schemeClr val="accent1"/>
+          </a:effectRef>
+          <a:fontRef idx="minor">
+            <a:schemeClr val="tx1"/>
+          </a:fontRef>
+        </p:style>
+      </p:cxnSp>
+      <p:cxnSp>
+        <p:nvCxnSpPr>
+          <p:cNvPr id="28" name="Straight Connector 27"/>
+          <p:cNvCxnSpPr>
+            <a:cxnSpLocks/>
+          </p:cNvCxnSpPr>
+          <p:nvPr/>
+        </p:nvCxnSpPr>
+        <p:spPr>
+          <a:xfrm>
+            <a:off x="10829030" y="2392095"/>
+            <a:ext cx="1" cy="461218"/>
+          </a:xfrm>
+          <a:prstGeom prst="line">
+            <a:avLst/>
+          </a:prstGeom>
+          <a:ln w="57150">
+            <a:solidFill>
+              <a:schemeClr val="tx1"/>
+            </a:solidFill>
+          </a:ln>
+        </p:spPr>
+        <p:style>
+          <a:lnRef idx="1">
+            <a:schemeClr val="accent1"/>
+          </a:lnRef>
+          <a:fillRef idx="0">
+            <a:schemeClr val="accent1"/>
+          </a:fillRef>
+          <a:effectRef idx="0">
+            <a:schemeClr val="accent1"/>
+          </a:effectRef>
+          <a:fontRef idx="minor">
+            <a:schemeClr val="tx1"/>
+          </a:fontRef>
+        </p:style>
+      </p:cxnSp>
+      <p:cxnSp>
+        <p:nvCxnSpPr>
+          <p:cNvPr id="29" name="Straight Connector 28"/>
+          <p:cNvCxnSpPr>
+            <a:cxnSpLocks/>
+          </p:cNvCxnSpPr>
+          <p:nvPr/>
+        </p:nvCxnSpPr>
+        <p:spPr>
+          <a:xfrm flipH="1">
+            <a:off x="1171737" y="3364513"/>
+            <a:ext cx="2" cy="888995"/>
+          </a:xfrm>
+          <a:prstGeom prst="line">
+            <a:avLst/>
+          </a:prstGeom>
+          <a:ln w="57150">
+            <a:solidFill>
+              <a:schemeClr val="tx1"/>
+            </a:solidFill>
+          </a:ln>
+        </p:spPr>
+        <p:style>
+          <a:lnRef idx="1">
+            <a:schemeClr val="accent1"/>
+          </a:lnRef>
+          <a:fillRef idx="0">
+            <a:schemeClr val="accent1"/>
+          </a:fillRef>
+          <a:effectRef idx="0">
+            <a:schemeClr val="accent1"/>
+          </a:effectRef>
+          <a:fontRef idx="minor">
+            <a:schemeClr val="tx1"/>
+          </a:fontRef>
+        </p:style>
+      </p:cxnSp>
+      <p:cxnSp>
+        <p:nvCxnSpPr>
+          <p:cNvPr id="31" name="Straight Connector 30"/>
+          <p:cNvCxnSpPr>
+            <a:cxnSpLocks/>
+          </p:cNvCxnSpPr>
+          <p:nvPr/>
+        </p:nvCxnSpPr>
+        <p:spPr>
+          <a:xfrm flipH="1">
+            <a:off x="5720817" y="3354805"/>
+            <a:ext cx="2" cy="888995"/>
+          </a:xfrm>
+          <a:prstGeom prst="line">
+            <a:avLst/>
+          </a:prstGeom>
+          <a:ln w="57150">
+            <a:solidFill>
+              <a:schemeClr val="tx1"/>
+            </a:solidFill>
+          </a:ln>
+        </p:spPr>
+        <p:style>
+          <a:lnRef idx="1">
+            <a:schemeClr val="accent1"/>
+          </a:lnRef>
+          <a:fillRef idx="0">
+            <a:schemeClr val="accent1"/>
+          </a:fillRef>
+          <a:effectRef idx="0">
+            <a:schemeClr val="accent1"/>
+          </a:effectRef>
+          <a:fontRef idx="minor">
+            <a:schemeClr val="tx1"/>
+          </a:fontRef>
+        </p:style>
+      </p:cxnSp>
+    </p:spTree>
+    <p:extLst>
+      <p:ext uri="{BB962C8B-B14F-4D97-AF65-F5344CB8AC3E}">
+        <p14:creationId xmlns:p14="http://schemas.microsoft.com/office/powerpoint/2010/main" val="3477135119"/>
+      </p:ext>
+    </p:extLst>
+  </p:cSld>
+  <p:clrMapOvr>
+    <a:masterClrMapping/>
+  </p:clrMapOvr>
+</p:sld>
+</file>
+
+<file path=ppt/slides/slide5.xml><?xml version="1.0" encoding="utf-8"?>
+<p:sld xmlns:a="http://schemas.openxmlformats.org/drawingml/2006/main" xmlns:r="http://schemas.openxmlformats.org/officeDocument/2006/relationships" xmlns:p="http://schemas.openxmlformats.org/presentationml/2006/main">
+  <p:cSld>
+    <p:spTree>
+      <p:nvGrpSpPr>
+        <p:cNvPr id="1" name=""/>
+        <p:cNvGrpSpPr/>
+        <p:nvPr/>
+      </p:nvGrpSpPr>
+      <p:grpSpPr>
+        <a:xfrm>
+          <a:off x="0" y="0"/>
+          <a:ext cx="0" cy="0"/>
+          <a:chOff x="0" y="0"/>
+          <a:chExt cx="0" cy="0"/>
+        </a:xfrm>
+      </p:grpSpPr>
+      <p:sp>
+        <p:nvSpPr>
+          <p:cNvPr id="2" name="Title 1"/>
+          <p:cNvSpPr>
+            <a:spLocks noGrp="1"/>
+          </p:cNvSpPr>
+          <p:nvPr>
+            <p:ph type="title"/>
+          </p:nvPr>
+        </p:nvSpPr>
+        <p:spPr/>
+        <p:txBody>
+          <a:bodyPr>
+            <a:normAutofit/>
+          </a:bodyPr>
+          <a:lstStyle/>
+          <a:p>
+            <a:pPr algn="ctr"/>
+            <a:r>
+              <a:rPr lang="en-GB" sz="5400" dirty="0"/>
+              <a:t>Site URLs</a:t>
+            </a:r>
+          </a:p>
+        </p:txBody>
+      </p:sp>
+      <p:sp>
+        <p:nvSpPr>
+          <p:cNvPr id="3" name="Content Placeholder 2"/>
+          <p:cNvSpPr>
+            <a:spLocks noGrp="1"/>
+          </p:cNvSpPr>
+          <p:nvPr>
+            <p:ph idx="1"/>
+          </p:nvPr>
+        </p:nvSpPr>
+        <p:spPr/>
+        <p:txBody>
+          <a:bodyPr>
+            <a:normAutofit lnSpcReduction="10000"/>
+          </a:bodyPr>
+          <a:lstStyle/>
+          <a:p>
+            <a:r>
+              <a:rPr lang="en-GB" dirty="0"/>
+              <a:t>/home</a:t>
+            </a:r>
+          </a:p>
+          <a:p>
+            <a:r>
+              <a:rPr lang="en-GB" dirty="0"/>
+              <a:t>/about</a:t>
+            </a:r>
+          </a:p>
+          <a:p>
+            <a:r>
+              <a:rPr lang="en-GB" dirty="0"/>
+              <a:t>/fact-or-fiction</a:t>
+            </a:r>
+          </a:p>
+          <a:p>
+            <a:r>
+              <a:rPr lang="en-GB" dirty="0"/>
+              <a:t>/</a:t>
+            </a:r>
+            <a:r>
+              <a:rPr lang="en-GB" dirty="0" err="1"/>
+              <a:t>newpost</a:t>
+            </a:r>
+            <a:endParaRPr lang="en-GB" dirty="0"/>
+          </a:p>
+          <a:p>
+            <a:r>
+              <a:rPr lang="en-GB" dirty="0"/>
+              <a:t>/news-stories</a:t>
+            </a:r>
+          </a:p>
+          <a:p>
+            <a:r>
+              <a:rPr lang="en-GB" dirty="0"/>
+              <a:t>/top-posts</a:t>
+            </a:r>
+          </a:p>
+          <a:p>
+            <a:r>
+              <a:rPr lang="en-GB" dirty="0"/>
+              <a:t>/admin</a:t>
+            </a:r>
+          </a:p>
+          <a:p>
+            <a:r>
+              <a:rPr lang="en-GB" dirty="0"/>
+              <a:t>/login</a:t>
+            </a:r>
+          </a:p>
+          <a:p>
+            <a:pPr lvl="1"/>
+            <a:r>
+              <a:rPr lang="en-GB" dirty="0"/>
+              <a:t>/login/</a:t>
+            </a:r>
+            <a:r>
+              <a:rPr lang="en-GB" dirty="0" err="1"/>
+              <a:t>myaccount</a:t>
+            </a:r>
+            <a:endParaRPr lang="en-GB" dirty="0"/>
+          </a:p>
+          <a:p>
+            <a:pPr marL="457200" lvl="1" indent="0">
+              <a:buNone/>
+            </a:pPr>
+            <a:endParaRPr lang="en-GB" dirty="0"/>
+          </a:p>
+        </p:txBody>
+      </p:sp>
+    </p:spTree>
+    <p:extLst>
+      <p:ext uri="{BB962C8B-B14F-4D97-AF65-F5344CB8AC3E}">
+        <p14:creationId xmlns:p14="http://schemas.microsoft.com/office/powerpoint/2010/main" val="3469478198"/>
+      </p:ext>
+    </p:extLst>
+  </p:cSld>
+  <p:clrMapOvr>
+    <a:masterClrMapping/>
+  </p:clrMapOvr>
+</p:sld>
+</file>
+
 <file path=ppt/theme/theme1.xml><?xml version="1.0" encoding="utf-8"?>
 <a:theme xmlns:a="http://schemas.openxmlformats.org/drawingml/2006/main" name="Office Theme">
   <a:themeElements>

</xml_diff>